<commit_message>
final version (no jokes)
</commit_message>
<xml_diff>
--- a/presentation.pptx
+++ b/presentation.pptx
@@ -272,7 +272,7 @@
           <a:p>
             <a:fld id="{1B2700B3-08F4-42F9-BD95-A86CB01488F8}" type="datetimeFigureOut">
               <a:rPr lang="ru-RU" smtClean="0"/>
-              <a:t>16.05.2022</a:t>
+              <a:t>17.05.2022</a:t>
             </a:fld>
             <a:endParaRPr lang="ru-RU" dirty="0"/>
           </a:p>
@@ -470,7 +470,7 @@
           <a:p>
             <a:fld id="{1B2700B3-08F4-42F9-BD95-A86CB01488F8}" type="datetimeFigureOut">
               <a:rPr lang="ru-RU" smtClean="0"/>
-              <a:t>16.05.2022</a:t>
+              <a:t>17.05.2022</a:t>
             </a:fld>
             <a:endParaRPr lang="ru-RU" dirty="0"/>
           </a:p>
@@ -678,7 +678,7 @@
           <a:p>
             <a:fld id="{1B2700B3-08F4-42F9-BD95-A86CB01488F8}" type="datetimeFigureOut">
               <a:rPr lang="ru-RU" smtClean="0"/>
-              <a:t>16.05.2022</a:t>
+              <a:t>17.05.2022</a:t>
             </a:fld>
             <a:endParaRPr lang="ru-RU" dirty="0"/>
           </a:p>
@@ -876,7 +876,7 @@
           <a:p>
             <a:fld id="{1B2700B3-08F4-42F9-BD95-A86CB01488F8}" type="datetimeFigureOut">
               <a:rPr lang="ru-RU" smtClean="0"/>
-              <a:t>16.05.2022</a:t>
+              <a:t>17.05.2022</a:t>
             </a:fld>
             <a:endParaRPr lang="ru-RU" dirty="0"/>
           </a:p>
@@ -1151,7 +1151,7 @@
           <a:p>
             <a:fld id="{1B2700B3-08F4-42F9-BD95-A86CB01488F8}" type="datetimeFigureOut">
               <a:rPr lang="ru-RU" smtClean="0"/>
-              <a:t>16.05.2022</a:t>
+              <a:t>17.05.2022</a:t>
             </a:fld>
             <a:endParaRPr lang="ru-RU" dirty="0"/>
           </a:p>
@@ -1416,7 +1416,7 @@
           <a:p>
             <a:fld id="{1B2700B3-08F4-42F9-BD95-A86CB01488F8}" type="datetimeFigureOut">
               <a:rPr lang="ru-RU" smtClean="0"/>
-              <a:t>16.05.2022</a:t>
+              <a:t>17.05.2022</a:t>
             </a:fld>
             <a:endParaRPr lang="ru-RU" dirty="0"/>
           </a:p>
@@ -1828,7 +1828,7 @@
           <a:p>
             <a:fld id="{1B2700B3-08F4-42F9-BD95-A86CB01488F8}" type="datetimeFigureOut">
               <a:rPr lang="ru-RU" smtClean="0"/>
-              <a:t>16.05.2022</a:t>
+              <a:t>17.05.2022</a:t>
             </a:fld>
             <a:endParaRPr lang="ru-RU" dirty="0"/>
           </a:p>
@@ -1969,7 +1969,7 @@
           <a:p>
             <a:fld id="{1B2700B3-08F4-42F9-BD95-A86CB01488F8}" type="datetimeFigureOut">
               <a:rPr lang="ru-RU" smtClean="0"/>
-              <a:t>16.05.2022</a:t>
+              <a:t>17.05.2022</a:t>
             </a:fld>
             <a:endParaRPr lang="ru-RU" dirty="0"/>
           </a:p>
@@ -2082,7 +2082,7 @@
           <a:p>
             <a:fld id="{1B2700B3-08F4-42F9-BD95-A86CB01488F8}" type="datetimeFigureOut">
               <a:rPr lang="ru-RU" smtClean="0"/>
-              <a:t>16.05.2022</a:t>
+              <a:t>17.05.2022</a:t>
             </a:fld>
             <a:endParaRPr lang="ru-RU" dirty="0"/>
           </a:p>
@@ -2393,7 +2393,7 @@
           <a:p>
             <a:fld id="{1B2700B3-08F4-42F9-BD95-A86CB01488F8}" type="datetimeFigureOut">
               <a:rPr lang="ru-RU" smtClean="0"/>
-              <a:t>16.05.2022</a:t>
+              <a:t>17.05.2022</a:t>
             </a:fld>
             <a:endParaRPr lang="ru-RU" dirty="0"/>
           </a:p>
@@ -2681,7 +2681,7 @@
           <a:p>
             <a:fld id="{1B2700B3-08F4-42F9-BD95-A86CB01488F8}" type="datetimeFigureOut">
               <a:rPr lang="ru-RU" smtClean="0"/>
-              <a:t>16.05.2022</a:t>
+              <a:t>17.05.2022</a:t>
             </a:fld>
             <a:endParaRPr lang="ru-RU" dirty="0"/>
           </a:p>
@@ -2922,7 +2922,7 @@
           <a:p>
             <a:fld id="{1B2700B3-08F4-42F9-BD95-A86CB01488F8}" type="datetimeFigureOut">
               <a:rPr lang="ru-RU" smtClean="0"/>
-              <a:t>16.05.2022</a:t>
+              <a:t>17.05.2022</a:t>
             </a:fld>
             <a:endParaRPr lang="ru-RU" dirty="0"/>
           </a:p>
@@ -3554,6 +3554,50 @@
           </a:prstGeom>
         </p:spPr>
       </p:pic>
+      <p:sp>
+        <p:nvSpPr>
+          <p:cNvPr id="4" name="TextBox 3">
+            <a:extLst>
+              <a:ext uri="{FF2B5EF4-FFF2-40B4-BE49-F238E27FC236}">
+                <a16:creationId xmlns:a16="http://schemas.microsoft.com/office/drawing/2014/main" id="{ED1634A3-A12B-E74C-4E40-3A32DD448315}"/>
+              </a:ext>
+            </a:extLst>
+          </p:cNvPr>
+          <p:cNvSpPr txBox="1"/>
+          <p:nvPr/>
+        </p:nvSpPr>
+        <p:spPr>
+          <a:xfrm>
+            <a:off x="10945534" y="6227363"/>
+            <a:ext cx="1105950" cy="584775"/>
+          </a:xfrm>
+          <a:prstGeom prst="rect">
+            <a:avLst/>
+          </a:prstGeom>
+          <a:noFill/>
+        </p:spPr>
+        <p:txBody>
+          <a:bodyPr wrap="square" rtlCol="0">
+            <a:spAutoFit/>
+          </a:bodyPr>
+          <a:lstStyle/>
+          <a:p>
+            <a:r>
+              <a:rPr lang="en-US" sz="3200" b="1" dirty="0">
+                <a:solidFill>
+                  <a:srgbClr val="E2EFD9"/>
+                </a:solidFill>
+              </a:rPr>
+              <a:t>2022</a:t>
+            </a:r>
+            <a:endParaRPr lang="ru-RU" sz="3200" b="1" dirty="0">
+              <a:solidFill>
+                <a:srgbClr val="E2EFD9"/>
+              </a:solidFill>
+            </a:endParaRPr>
+          </a:p>
+        </p:txBody>
+      </p:sp>
     </p:spTree>
     <p:extLst>
       <p:ext uri="{BB962C8B-B14F-4D97-AF65-F5344CB8AC3E}">
@@ -4445,7 +4489,7 @@
         </p:nvSpPr>
         <p:spPr>
           <a:xfrm>
-            <a:off x="771089" y="1359017"/>
+            <a:off x="980814" y="1677799"/>
             <a:ext cx="3347906" cy="902123"/>
           </a:xfrm>
         </p:spPr>
@@ -4479,7 +4523,7 @@
         </p:nvSpPr>
         <p:spPr>
           <a:xfrm>
-            <a:off x="787866" y="2103991"/>
+            <a:off x="997591" y="2464718"/>
             <a:ext cx="5696824" cy="3441133"/>
           </a:xfrm>
         </p:spPr>
@@ -5179,7 +5223,7 @@
         </p:blipFill>
         <p:spPr>
           <a:xfrm>
-            <a:off x="7325079" y="3726185"/>
+            <a:off x="7484470" y="3726185"/>
             <a:ext cx="3916169" cy="2534856"/>
           </a:xfrm>
           <a:prstGeom prst="rect">

</xml_diff>

<commit_message>
I just want to be happy...
</commit_message>
<xml_diff>
--- a/presentation.pptx
+++ b/presentation.pptx
@@ -3719,7 +3719,7 @@
         <p:spPr>
           <a:xfrm>
             <a:off x="6475607" y="5435301"/>
-            <a:ext cx="3331129" cy="590403"/>
+            <a:ext cx="3163343" cy="590403"/>
           </a:xfrm>
         </p:spPr>
         <p:txBody>
@@ -3731,7 +3731,7 @@
             </a:pPr>
             <a:r>
               <a:rPr lang="en-US" b="1" dirty="0"/>
-              <a:t>Looking for the hit</a:t>
+              <a:t>Tracks the hitting</a:t>
             </a:r>
           </a:p>
         </p:txBody>
@@ -3893,11 +3893,13 @@
         <p:spPr>
           <a:xfrm>
             <a:off x="593817" y="4164325"/>
-            <a:ext cx="3331129" cy="590403"/>
-          </a:xfrm>
-        </p:spPr>
-        <p:txBody>
-          <a:bodyPr/>
+            <a:ext cx="3919460" cy="590403"/>
+          </a:xfrm>
+        </p:spPr>
+        <p:txBody>
+          <a:bodyPr>
+            <a:normAutofit/>
+          </a:bodyPr>
           <a:lstStyle/>
           <a:p>
             <a:pPr marL="0" indent="0">
@@ -3905,7 +3907,7 @@
             </a:pPr>
             <a:r>
               <a:rPr lang="en-US" b="1" dirty="0"/>
-              <a:t>Player and CdM-8</a:t>
+              <a:t>Player’s and CdM-8’s</a:t>
             </a:r>
           </a:p>
         </p:txBody>
@@ -4184,8 +4186,8 @@
         </p:blipFill>
         <p:spPr>
           <a:xfrm rot="5400000">
-            <a:off x="8979713" y="3645717"/>
-            <a:ext cx="5037591" cy="1386980"/>
+            <a:off x="8157592" y="2823598"/>
+            <a:ext cx="5037591" cy="3031220"/>
           </a:xfrm>
           <a:prstGeom prst="rect">
             <a:avLst/>
@@ -4240,13 +4242,13 @@
         </p:nvSpPr>
         <p:spPr>
           <a:xfrm>
-            <a:off x="5401811" y="4298027"/>
-            <a:ext cx="3633132" cy="855677"/>
+            <a:off x="4648867" y="1017928"/>
+            <a:ext cx="3907903" cy="855677"/>
           </a:xfrm>
         </p:spPr>
         <p:txBody>
           <a:bodyPr>
-            <a:normAutofit fontScale="90000"/>
+            <a:normAutofit/>
           </a:bodyPr>
           <a:lstStyle/>
           <a:p>
@@ -4276,13 +4278,13 @@
         </p:nvSpPr>
         <p:spPr>
           <a:xfrm>
-            <a:off x="5443755" y="5069814"/>
-            <a:ext cx="5755547" cy="685033"/>
+            <a:off x="4690810" y="1915550"/>
+            <a:ext cx="3505637" cy="2463504"/>
           </a:xfrm>
         </p:spPr>
         <p:txBody>
           <a:bodyPr>
-            <a:normAutofit fontScale="92500"/>
+            <a:normAutofit/>
           </a:bodyPr>
           <a:lstStyle/>
           <a:p>
@@ -4291,7 +4293,25 @@
             </a:pPr>
             <a:r>
               <a:rPr lang="es-ES" b="1" dirty="0"/>
-              <a:t>255 - (y + (240 - x) / vx * vy - 255)</a:t>
+              <a:t>Your opponent.</a:t>
+            </a:r>
+          </a:p>
+          <a:p>
+            <a:pPr marL="0" indent="0">
+              <a:buNone/>
+            </a:pPr>
+            <a:r>
+              <a:rPr lang="es-ES" b="1" dirty="0"/>
+              <a:t>Pretty simple, actually.</a:t>
+            </a:r>
+          </a:p>
+          <a:p>
+            <a:pPr marL="0" indent="0">
+              <a:buNone/>
+            </a:pPr>
+            <a:r>
+              <a:rPr lang="es-ES" b="1" dirty="0"/>
+              <a:t>Formula is the bot.</a:t>
             </a:r>
             <a:endParaRPr lang="ru-RU" b="1" dirty="0"/>
           </a:p>
@@ -4325,8 +4345,8 @@
         </p:blipFill>
         <p:spPr>
           <a:xfrm>
-            <a:off x="1118964" y="283715"/>
-            <a:ext cx="3436258" cy="6290569"/>
+            <a:off x="572778" y="220211"/>
+            <a:ext cx="3505638" cy="6417578"/>
           </a:xfrm>
           <a:prstGeom prst="rect">
             <a:avLst/>
@@ -4335,10 +4355,10 @@
       </p:pic>
       <p:pic>
         <p:nvPicPr>
-          <p:cNvPr id="5" name="Рисунок 4">
-            <a:extLst>
-              <a:ext uri="{FF2B5EF4-FFF2-40B4-BE49-F238E27FC236}">
-                <a16:creationId xmlns:a16="http://schemas.microsoft.com/office/drawing/2014/main" id="{17A12DAA-74F0-4BDE-934D-D7D678E6B6A9}"/>
+          <p:cNvPr id="8" name="Рисунок 7">
+            <a:extLst>
+              <a:ext uri="{FF2B5EF4-FFF2-40B4-BE49-F238E27FC236}">
+                <a16:creationId xmlns:a16="http://schemas.microsoft.com/office/drawing/2014/main" id="{6F6BA5F4-AFC7-D84C-6825-454EED8E3C9D}"/>
               </a:ext>
             </a:extLst>
           </p:cNvPr>
@@ -4360,9 +4380,9 @@
           </a:stretch>
         </p:blipFill>
         <p:spPr>
-          <a:xfrm>
-            <a:off x="6925403" y="1105243"/>
-            <a:ext cx="2792249" cy="2591641"/>
+          <a:xfrm rot="5400000">
+            <a:off x="9245782" y="-85571"/>
+            <a:ext cx="2860646" cy="3031788"/>
           </a:xfrm>
           <a:prstGeom prst="rect">
             <a:avLst/>
@@ -4371,10 +4391,91 @@
       </p:pic>
       <p:pic>
         <p:nvPicPr>
-          <p:cNvPr id="8" name="Рисунок 7">
-            <a:extLst>
-              <a:ext uri="{FF2B5EF4-FFF2-40B4-BE49-F238E27FC236}">
-                <a16:creationId xmlns:a16="http://schemas.microsoft.com/office/drawing/2014/main" id="{6F6BA5F4-AFC7-D84C-6825-454EED8E3C9D}"/>
+          <p:cNvPr id="9" name="Рисунок 8">
+            <a:extLst>
+              <a:ext uri="{FF2B5EF4-FFF2-40B4-BE49-F238E27FC236}">
+                <a16:creationId xmlns:a16="http://schemas.microsoft.com/office/drawing/2014/main" id="{679D5255-42EB-7B6B-B90C-88D47EDF487C}"/>
+              </a:ext>
+            </a:extLst>
+          </p:cNvPr>
+          <p:cNvPicPr>
+            <a:picLocks noChangeAspect="1"/>
+          </p:cNvPicPr>
+          <p:nvPr/>
+        </p:nvPicPr>
+        <p:blipFill>
+          <a:blip r:embed="rId3">
+            <a:extLst>
+              <a:ext uri="{28A0092B-C50C-407E-A947-70E740481C1C}">
+                <a14:useLocalDpi xmlns:a14="http://schemas.microsoft.com/office/drawing/2010/main" val="0"/>
+              </a:ext>
+            </a:extLst>
+          </a:blip>
+          <a:stretch>
+            <a:fillRect/>
+          </a:stretch>
+        </p:blipFill>
+        <p:spPr>
+          <a:xfrm rot="5400000">
+            <a:off x="7389997" y="2056004"/>
+            <a:ext cx="1967222" cy="7636777"/>
+          </a:xfrm>
+          <a:prstGeom prst="rect">
+            <a:avLst/>
+          </a:prstGeom>
+        </p:spPr>
+      </p:pic>
+      <p:sp>
+        <p:nvSpPr>
+          <p:cNvPr id="4" name="TextBox 3">
+            <a:extLst>
+              <a:ext uri="{FF2B5EF4-FFF2-40B4-BE49-F238E27FC236}">
+                <a16:creationId xmlns:a16="http://schemas.microsoft.com/office/drawing/2014/main" id="{F871734F-02B2-0817-44FA-89F0C0D8CF51}"/>
+              </a:ext>
+            </a:extLst>
+          </p:cNvPr>
+          <p:cNvSpPr txBox="1"/>
+          <p:nvPr/>
+        </p:nvSpPr>
+        <p:spPr>
+          <a:xfrm>
+            <a:off x="5799828" y="5643559"/>
+            <a:ext cx="5147563" cy="461665"/>
+          </a:xfrm>
+          <a:prstGeom prst="rect">
+            <a:avLst/>
+          </a:prstGeom>
+          <a:noFill/>
+        </p:spPr>
+        <p:txBody>
+          <a:bodyPr wrap="none" rtlCol="0">
+            <a:spAutoFit/>
+          </a:bodyPr>
+          <a:lstStyle/>
+          <a:p>
+            <a:pPr algn="ctr"/>
+            <a:r>
+              <a:rPr lang="es-ES" sz="2400" b="1" dirty="0">
+                <a:solidFill>
+                  <a:srgbClr val="E2EFD9"/>
+                </a:solidFill>
+              </a:rPr>
+              <a:t>255 - (y + (240 - x) / vx * vy - 255)</a:t>
+            </a:r>
+            <a:endParaRPr lang="ru-RU" sz="2400" b="1" dirty="0">
+              <a:solidFill>
+                <a:srgbClr val="E2EFD9"/>
+              </a:solidFill>
+            </a:endParaRPr>
+          </a:p>
+        </p:txBody>
+      </p:sp>
+      <p:pic>
+        <p:nvPicPr>
+          <p:cNvPr id="10" name="Рисунок 9">
+            <a:extLst>
+              <a:ext uri="{FF2B5EF4-FFF2-40B4-BE49-F238E27FC236}">
+                <a16:creationId xmlns:a16="http://schemas.microsoft.com/office/drawing/2014/main" id="{7AEE3BD3-D6AC-A0C9-AA9C-475C4E408DB5}"/>
               </a:ext>
             </a:extLst>
           </p:cNvPr>
@@ -4396,45 +4497,9 @@
           </a:stretch>
         </p:blipFill>
         <p:spPr>
-          <a:xfrm rot="5400000">
-            <a:off x="10844167" y="-39146"/>
-            <a:ext cx="1308686" cy="1386980"/>
-          </a:xfrm>
-          <a:prstGeom prst="rect">
-            <a:avLst/>
-          </a:prstGeom>
-        </p:spPr>
-      </p:pic>
-      <p:pic>
-        <p:nvPicPr>
-          <p:cNvPr id="9" name="Рисунок 8">
-            <a:extLst>
-              <a:ext uri="{FF2B5EF4-FFF2-40B4-BE49-F238E27FC236}">
-                <a16:creationId xmlns:a16="http://schemas.microsoft.com/office/drawing/2014/main" id="{679D5255-42EB-7B6B-B90C-88D47EDF487C}"/>
-              </a:ext>
-            </a:extLst>
-          </p:cNvPr>
-          <p:cNvPicPr>
-            <a:picLocks noChangeAspect="1"/>
-          </p:cNvPicPr>
-          <p:nvPr/>
-        </p:nvPicPr>
-        <p:blipFill>
-          <a:blip r:embed="rId4">
-            <a:extLst>
-              <a:ext uri="{28A0092B-C50C-407E-A947-70E740481C1C}">
-                <a14:useLocalDpi xmlns:a14="http://schemas.microsoft.com/office/drawing/2010/main" val="0"/>
-              </a:ext>
-            </a:extLst>
-          </a:blip>
-          <a:stretch>
-            <a:fillRect/>
-          </a:stretch>
-        </p:blipFill>
-        <p:spPr>
-          <a:xfrm rot="5400000">
-            <a:off x="7945771" y="2611777"/>
-            <a:ext cx="855677" cy="7636777"/>
+          <a:xfrm>
+            <a:off x="9513116" y="296626"/>
+            <a:ext cx="2400686" cy="2228209"/>
           </a:xfrm>
           <a:prstGeom prst="rect">
             <a:avLst/>
@@ -4545,7 +4610,7 @@
             </a:pPr>
             <a:r>
               <a:rPr lang="en-US" b="1" dirty="0"/>
-              <a:t>Now we ready to answer your questions.</a:t>
+              <a:t>Now we are ready to answer your questions.</a:t>
             </a:r>
             <a:endParaRPr lang="ru-RU" b="1" dirty="0"/>
           </a:p>
@@ -5018,7 +5083,7 @@
             </a:pPr>
             <a:r>
               <a:rPr lang="en-US" b="1" dirty="0"/>
-              <a:t>We divided our presentation into 3 parts:</a:t>
+              <a:t>We have divided our presentation into 3 parts:</a:t>
             </a:r>
           </a:p>
           <a:p>
@@ -5316,11 +5381,13 @@
         <p:spPr>
           <a:xfrm>
             <a:off x="823894" y="1825624"/>
-            <a:ext cx="5143150" cy="3769832"/>
-          </a:xfrm>
-        </p:spPr>
-        <p:txBody>
-          <a:bodyPr/>
+            <a:ext cx="5143150" cy="3073548"/>
+          </a:xfrm>
+        </p:spPr>
+        <p:txBody>
+          <a:bodyPr>
+            <a:normAutofit/>
+          </a:bodyPr>
           <a:lstStyle/>
           <a:p>
             <a:pPr marL="0" indent="0">
@@ -5337,18 +5404,8 @@
             </a:pPr>
             <a:r>
               <a:rPr lang="en-US" b="1" dirty="0"/>
-              <a:t>32x32 video display, scores, ball, two bats (one controlled by player, other one by bot), joystick (to control player’s bat).</a:t>
-            </a:r>
-          </a:p>
-          <a:p>
-            <a:pPr marL="0" indent="0">
-              <a:buNone/>
-            </a:pPr>
-            <a:r>
-              <a:rPr lang="en-US" b="1" dirty="0"/>
-              <a:t>Game ends when someone gets 24 points.</a:t>
-            </a:r>
-            <a:endParaRPr lang="ru-RU" b="1" dirty="0"/>
+              <a:t>32x32 video display, scores, ball, two bats (one controlled by player, other one by bot), joystick (to control player’s bat) and some LEDs.</a:t>
+            </a:r>
           </a:p>
         </p:txBody>
       </p:sp>
@@ -5460,6 +5517,50 @@
           </a:prstGeom>
         </p:spPr>
       </p:pic>
+      <p:sp>
+        <p:nvSpPr>
+          <p:cNvPr id="7" name="TextBox 6">
+            <a:extLst>
+              <a:ext uri="{FF2B5EF4-FFF2-40B4-BE49-F238E27FC236}">
+                <a16:creationId xmlns:a16="http://schemas.microsoft.com/office/drawing/2014/main" id="{30366143-6E87-14AA-028D-14C7D996B569}"/>
+              </a:ext>
+            </a:extLst>
+          </p:cNvPr>
+          <p:cNvSpPr txBox="1"/>
+          <p:nvPr/>
+        </p:nvSpPr>
+        <p:spPr>
+          <a:xfrm>
+            <a:off x="6611920" y="6082566"/>
+            <a:ext cx="3363985" cy="523220"/>
+          </a:xfrm>
+          <a:prstGeom prst="rect">
+            <a:avLst/>
+          </a:prstGeom>
+          <a:noFill/>
+        </p:spPr>
+        <p:txBody>
+          <a:bodyPr wrap="square" rtlCol="0">
+            <a:spAutoFit/>
+          </a:bodyPr>
+          <a:lstStyle/>
+          <a:p>
+            <a:r>
+              <a:rPr lang="en-US" sz="2800" b="1" dirty="0">
+                <a:solidFill>
+                  <a:srgbClr val="E2EFD9"/>
+                </a:solidFill>
+              </a:rPr>
+              <a:t>24 points = Victory</a:t>
+            </a:r>
+            <a:endParaRPr lang="ru-RU" sz="2800" b="1" dirty="0">
+              <a:solidFill>
+                <a:srgbClr val="E2EFD9"/>
+              </a:solidFill>
+            </a:endParaRPr>
+          </a:p>
+        </p:txBody>
+      </p:sp>
     </p:spTree>
     <p:extLst>
       <p:ext uri="{BB962C8B-B14F-4D97-AF65-F5344CB8AC3E}">
@@ -5683,12 +5784,12 @@
         <p:spPr>
           <a:xfrm>
             <a:off x="7255775" y="3870708"/>
-            <a:ext cx="4564312" cy="674264"/>
+            <a:ext cx="2752291" cy="674264"/>
           </a:xfrm>
         </p:spPr>
         <p:txBody>
           <a:bodyPr>
-            <a:normAutofit fontScale="92500"/>
+            <a:normAutofit/>
           </a:bodyPr>
           <a:lstStyle/>
           <a:p>
@@ -5697,7 +5798,7 @@
             </a:pPr>
             <a:r>
               <a:rPr lang="en-US" b="1" dirty="0"/>
-              <a:t>Here you look and perform</a:t>
+              <a:t>You play here</a:t>
             </a:r>
           </a:p>
         </p:txBody>
@@ -5858,7 +5959,7 @@
         </p:nvSpPr>
         <p:spPr>
           <a:xfrm>
-            <a:off x="7991052" y="3131120"/>
+            <a:off x="8091720" y="3131120"/>
             <a:ext cx="3859635" cy="776288"/>
           </a:xfrm>
         </p:spPr>
@@ -5894,7 +5995,7 @@
         </p:nvSpPr>
         <p:spPr>
           <a:xfrm>
-            <a:off x="7977229" y="3870708"/>
+            <a:off x="8077897" y="3837152"/>
             <a:ext cx="3859635" cy="674264"/>
           </a:xfrm>
         </p:spPr>
@@ -6068,7 +6169,7 @@
         </p:nvSpPr>
         <p:spPr>
           <a:xfrm>
-            <a:off x="8614803" y="4513280"/>
+            <a:off x="8614803" y="4572003"/>
             <a:ext cx="3012347" cy="1468073"/>
           </a:xfrm>
         </p:spPr>
@@ -6111,7 +6212,7 @@
         </p:nvSpPr>
         <p:spPr>
           <a:xfrm>
-            <a:off x="8631582" y="5877512"/>
+            <a:off x="8631582" y="5936235"/>
             <a:ext cx="3255492" cy="548459"/>
           </a:xfrm>
         </p:spPr>

</xml_diff>